<commit_message>
Phase 2 of Refactoring VMWishes Common from TheGame GamePlayer, LocalPlayer, Opponent
</commit_message>
<xml_diff>
--- a/TheGameFlow.pptx
+++ b/TheGameFlow.pptx
@@ -223,7 +223,7 @@
           <a:p>
             <a:fld id="{F086C141-1066-44E4-BFEC-9DECA7045D94}" type="datetimeFigureOut">
               <a:rPr lang="en-US" smtClean="0"/>
-              <a:t>4/24/20</a:t>
+              <a:t>4/25/20</a:t>
             </a:fld>
             <a:endParaRPr lang="en-US"/>
           </a:p>
@@ -407,7 +407,7 @@
           <a:p>
             <a:fld id="{0FE44D03-F8BF-4F8E-AC93-896085F0F2A6}" type="datetimeFigureOut">
               <a:rPr lang="en-US" smtClean="0"/>
-              <a:t>4/24/20</a:t>
+              <a:t>4/25/20</a:t>
             </a:fld>
             <a:endParaRPr lang="en-US"/>
           </a:p>
@@ -809,7 +809,7 @@
           <a:p>
             <a:fld id="{6A056EF8-C178-4D51-8636-9043AFE5148D}" type="datetimeFigureOut">
               <a:rPr lang="en-US" smtClean="0"/>
-              <a:t>4/24/20</a:t>
+              <a:t>4/25/20</a:t>
             </a:fld>
             <a:endParaRPr lang="en-US"/>
           </a:p>
@@ -979,7 +979,7 @@
           <a:p>
             <a:fld id="{6A056EF8-C178-4D51-8636-9043AFE5148D}" type="datetimeFigureOut">
               <a:rPr lang="en-US" smtClean="0"/>
-              <a:t>4/24/20</a:t>
+              <a:t>4/25/20</a:t>
             </a:fld>
             <a:endParaRPr lang="en-US"/>
           </a:p>
@@ -1159,7 +1159,7 @@
           <a:p>
             <a:fld id="{6A056EF8-C178-4D51-8636-9043AFE5148D}" type="datetimeFigureOut">
               <a:rPr lang="en-US" smtClean="0"/>
-              <a:t>4/24/20</a:t>
+              <a:t>4/25/20</a:t>
             </a:fld>
             <a:endParaRPr lang="en-US"/>
           </a:p>
@@ -1329,7 +1329,7 @@
           <a:p>
             <a:fld id="{6A056EF8-C178-4D51-8636-9043AFE5148D}" type="datetimeFigureOut">
               <a:rPr lang="en-US" smtClean="0"/>
-              <a:t>4/24/20</a:t>
+              <a:t>4/25/20</a:t>
             </a:fld>
             <a:endParaRPr lang="en-US"/>
           </a:p>
@@ -1573,7 +1573,7 @@
           <a:p>
             <a:fld id="{6A056EF8-C178-4D51-8636-9043AFE5148D}" type="datetimeFigureOut">
               <a:rPr lang="en-US" smtClean="0"/>
-              <a:t>4/24/20</a:t>
+              <a:t>4/25/20</a:t>
             </a:fld>
             <a:endParaRPr lang="en-US"/>
           </a:p>
@@ -1805,7 +1805,7 @@
           <a:p>
             <a:fld id="{6A056EF8-C178-4D51-8636-9043AFE5148D}" type="datetimeFigureOut">
               <a:rPr lang="en-US" smtClean="0"/>
-              <a:t>4/24/20</a:t>
+              <a:t>4/25/20</a:t>
             </a:fld>
             <a:endParaRPr lang="en-US"/>
           </a:p>
@@ -2172,7 +2172,7 @@
           <a:p>
             <a:fld id="{6A056EF8-C178-4D51-8636-9043AFE5148D}" type="datetimeFigureOut">
               <a:rPr lang="en-US" smtClean="0"/>
-              <a:t>4/24/20</a:t>
+              <a:t>4/25/20</a:t>
             </a:fld>
             <a:endParaRPr lang="en-US"/>
           </a:p>
@@ -2290,7 +2290,7 @@
           <a:p>
             <a:fld id="{6A056EF8-C178-4D51-8636-9043AFE5148D}" type="datetimeFigureOut">
               <a:rPr lang="en-US" smtClean="0"/>
-              <a:t>4/24/20</a:t>
+              <a:t>4/25/20</a:t>
             </a:fld>
             <a:endParaRPr lang="en-US"/>
           </a:p>
@@ -2385,7 +2385,7 @@
           <a:p>
             <a:fld id="{6A056EF8-C178-4D51-8636-9043AFE5148D}" type="datetimeFigureOut">
               <a:rPr lang="en-US" smtClean="0"/>
-              <a:t>4/24/20</a:t>
+              <a:t>4/25/20</a:t>
             </a:fld>
             <a:endParaRPr lang="en-US"/>
           </a:p>
@@ -2662,7 +2662,7 @@
           <a:p>
             <a:fld id="{6A056EF8-C178-4D51-8636-9043AFE5148D}" type="datetimeFigureOut">
               <a:rPr lang="en-US" smtClean="0"/>
-              <a:t>4/24/20</a:t>
+              <a:t>4/25/20</a:t>
             </a:fld>
             <a:endParaRPr lang="en-US"/>
           </a:p>
@@ -2919,7 +2919,7 @@
           <a:p>
             <a:fld id="{6A056EF8-C178-4D51-8636-9043AFE5148D}" type="datetimeFigureOut">
               <a:rPr lang="en-US" smtClean="0"/>
-              <a:t>4/24/20</a:t>
+              <a:t>4/25/20</a:t>
             </a:fld>
             <a:endParaRPr lang="en-US"/>
           </a:p>
@@ -3180,7 +3180,7 @@
           <a:p>
             <a:fld id="{6A056EF8-C178-4D51-8636-9043AFE5148D}" type="datetimeFigureOut">
               <a:rPr lang="en-US" smtClean="0"/>
-              <a:t>4/24/20</a:t>
+              <a:t>4/25/20</a:t>
             </a:fld>
             <a:endParaRPr lang="en-US"/>
           </a:p>
@@ -3550,6 +3550,65 @@
       </p:grpSpPr>
       <p:sp>
         <p:nvSpPr>
+          <p:cNvPr id="11" name="Rectangle 10">
+            <a:extLst>
+              <a:ext uri="{FF2B5EF4-FFF2-40B4-BE49-F238E27FC236}">
+                <a16:creationId xmlns:a16="http://schemas.microsoft.com/office/drawing/2014/main" id="{5B67646E-4EAC-7D4E-9A37-1A7A72EBA4E1}"/>
+              </a:ext>
+            </a:extLst>
+          </p:cNvPr>
+          <p:cNvSpPr/>
+          <p:nvPr/>
+        </p:nvSpPr>
+        <p:spPr>
+          <a:xfrm>
+            <a:off x="737937" y="1439184"/>
+            <a:ext cx="6549227" cy="2844058"/>
+          </a:xfrm>
+          <a:prstGeom prst="rect">
+            <a:avLst/>
+          </a:prstGeom>
+          <a:solidFill>
+            <a:srgbClr val="FBF6E5"/>
+          </a:solidFill>
+          <a:ln>
+            <a:solidFill>
+              <a:schemeClr val="accent4"/>
+            </a:solidFill>
+            <a:prstDash val="dash"/>
+          </a:ln>
+        </p:spPr>
+        <p:style>
+          <a:lnRef idx="2">
+            <a:schemeClr val="accent2"/>
+          </a:lnRef>
+          <a:fillRef idx="1">
+            <a:schemeClr val="lt1"/>
+          </a:fillRef>
+          <a:effectRef idx="0">
+            <a:schemeClr val="accent2"/>
+          </a:effectRef>
+          <a:fontRef idx="minor">
+            <a:schemeClr val="dk1"/>
+          </a:fontRef>
+        </p:style>
+        <p:txBody>
+          <a:bodyPr rtlCol="0" anchor="t" anchorCtr="0"/>
+          <a:lstStyle/>
+          <a:p>
+            <a:r>
+              <a:rPr lang="en-US" sz="1600" i="1" dirty="0">
+                <a:solidFill>
+                  <a:schemeClr val="accent2"/>
+                </a:solidFill>
+              </a:rPr>
+              <a:t>Me</a:t>
+            </a:r>
+          </a:p>
+        </p:txBody>
+      </p:sp>
+      <p:sp>
+        <p:nvSpPr>
           <p:cNvPr id="133" name="Footer Placeholder 132">
             <a:extLst>
               <a:ext uri="{FF2B5EF4-FFF2-40B4-BE49-F238E27FC236}">
@@ -3597,7 +3656,7 @@
         </p:nvSpPr>
         <p:spPr>
           <a:xfrm>
-            <a:off x="3788216" y="4482076"/>
+            <a:off x="3789164" y="4529748"/>
             <a:ext cx="926926" cy="531844"/>
           </a:xfrm>
           <a:prstGeom prst="rect">
@@ -3802,7 +3861,7 @@
         </p:nvSpPr>
         <p:spPr>
           <a:xfrm>
-            <a:off x="3793706" y="885872"/>
+            <a:off x="3793706" y="557011"/>
             <a:ext cx="926926" cy="541740"/>
           </a:xfrm>
           <a:prstGeom prst="rect">
@@ -3904,8 +3963,8 @@
         </p:nvCxnSpPr>
         <p:spPr>
           <a:xfrm rot="10800000" flipH="1">
-            <a:off x="3662808" y="1156743"/>
-            <a:ext cx="130897" cy="808355"/>
+            <a:off x="3662808" y="827881"/>
+            <a:ext cx="130897" cy="1137216"/>
           </a:xfrm>
           <a:prstGeom prst="curvedConnector3">
             <a:avLst>
@@ -4022,8 +4081,8 @@
         </p:nvCxnSpPr>
         <p:spPr>
           <a:xfrm>
-            <a:off x="4257169" y="1427612"/>
-            <a:ext cx="0" cy="352005"/>
+            <a:off x="4257169" y="1098751"/>
+            <a:ext cx="0" cy="680866"/>
           </a:xfrm>
           <a:prstGeom prst="straightConnector1">
             <a:avLst/>
@@ -4109,7 +4168,7 @@
         </p:nvSpPr>
         <p:spPr>
           <a:xfrm>
-            <a:off x="3392859" y="1426190"/>
+            <a:off x="3392859" y="1097329"/>
             <a:ext cx="421719" cy="276999"/>
           </a:xfrm>
           <a:prstGeom prst="rect">
@@ -4839,7 +4898,7 @@
         <p:spPr>
           <a:xfrm flipV="1">
             <a:off x="4851529" y="2676234"/>
-            <a:ext cx="2022536" cy="11828"/>
+            <a:ext cx="2704321" cy="11828"/>
           </a:xfrm>
           <a:prstGeom prst="straightConnector1">
             <a:avLst/>
@@ -4880,7 +4939,7 @@
         </p:nvSpPr>
         <p:spPr>
           <a:xfrm>
-            <a:off x="1409955" y="4100307"/>
+            <a:off x="1409955" y="4516541"/>
             <a:ext cx="926926" cy="531844"/>
           </a:xfrm>
           <a:prstGeom prst="rect">
@@ -4962,7 +5021,7 @@
         </p:nvSpPr>
         <p:spPr>
           <a:xfrm>
-            <a:off x="6874065" y="2410312"/>
+            <a:off x="7555850" y="2410312"/>
             <a:ext cx="926926" cy="531844"/>
           </a:xfrm>
           <a:prstGeom prst="rect">
@@ -5044,7 +5103,7 @@
         </p:nvSpPr>
         <p:spPr>
           <a:xfrm>
-            <a:off x="5768495" y="4100307"/>
+            <a:off x="5768495" y="4529748"/>
             <a:ext cx="926926" cy="531844"/>
           </a:xfrm>
           <a:prstGeom prst="rect">
@@ -5131,7 +5190,7 @@
         <p:spPr>
           <a:xfrm flipH="1">
             <a:off x="1873418" y="3659875"/>
-            <a:ext cx="1" cy="440432"/>
+            <a:ext cx="1" cy="856666"/>
           </a:xfrm>
           <a:prstGeom prst="straightConnector1">
             <a:avLst/>
@@ -5248,7 +5307,7 @@
         <p:spPr>
           <a:xfrm>
             <a:off x="6231958" y="3659875"/>
-            <a:ext cx="0" cy="440432"/>
+            <a:ext cx="0" cy="869873"/>
           </a:xfrm>
           <a:prstGeom prst="straightConnector1">
             <a:avLst/>
@@ -5296,7 +5355,7 @@
         <p:spPr>
           <a:xfrm flipV="1">
             <a:off x="6826318" y="2942156"/>
-            <a:ext cx="511210" cy="532239"/>
+            <a:ext cx="1192995" cy="532239"/>
           </a:xfrm>
           <a:prstGeom prst="curvedConnector2">
             <a:avLst/>
@@ -5507,17 +5566,19 @@
           <p:cNvCxnSpPr>
             <a:cxnSpLocks/>
             <a:stCxn id="199" idx="4"/>
-            <a:endCxn id="233" idx="3"/>
+            <a:endCxn id="233" idx="0"/>
           </p:cNvCxnSpPr>
           <p:nvPr/>
         </p:nvCxnSpPr>
         <p:spPr>
           <a:xfrm rot="5400000">
-            <a:off x="2940467" y="3047974"/>
-            <a:ext cx="714670" cy="1921841"/>
-          </a:xfrm>
-          <a:prstGeom prst="curvedConnector2">
-            <a:avLst/>
+            <a:off x="2633579" y="2891398"/>
+            <a:ext cx="864982" cy="2385304"/>
+          </a:xfrm>
+          <a:prstGeom prst="curvedConnector3">
+            <a:avLst>
+              <a:gd name="adj1" fmla="val 50000"/>
+            </a:avLst>
           </a:prstGeom>
           <a:ln>
             <a:solidFill>
@@ -5596,8 +5657,8 @@
         </p:nvCxnSpPr>
         <p:spPr>
           <a:xfrm rot="5400000">
-            <a:off x="3839943" y="4063296"/>
-            <a:ext cx="830517" cy="7043"/>
+            <a:off x="3816581" y="4087606"/>
+            <a:ext cx="878189" cy="6095"/>
           </a:xfrm>
           <a:prstGeom prst="curvedConnector3">
             <a:avLst>
@@ -5711,12 +5772,12 @@
         </p:nvCxnSpPr>
         <p:spPr>
           <a:xfrm rot="10800000" flipH="1">
-            <a:off x="3664362" y="1156743"/>
-            <a:ext cx="129344" cy="2309337"/>
+            <a:off x="3664362" y="827881"/>
+            <a:ext cx="129344" cy="2638198"/>
           </a:xfrm>
           <a:prstGeom prst="curvedConnector3">
             <a:avLst>
-              <a:gd name="adj1" fmla="val -614375"/>
+              <a:gd name="adj1" fmla="val -604630"/>
             </a:avLst>
           </a:prstGeom>
           <a:ln>
@@ -5759,8 +5820,8 @@
         </p:nvCxnSpPr>
         <p:spPr>
           <a:xfrm rot="10800000" flipH="1">
-            <a:off x="1279058" y="1156743"/>
-            <a:ext cx="2514647" cy="2317653"/>
+            <a:off x="1279058" y="827881"/>
+            <a:ext cx="2514647" cy="2646514"/>
           </a:xfrm>
           <a:prstGeom prst="curvedConnector3">
             <a:avLst>
@@ -5855,6 +5916,84 @@
             <a:r>
               <a:rPr lang="en-US" sz="1200" i="1" dirty="0"/>
               <a:t>fail</a:t>
+            </a:r>
+          </a:p>
+        </p:txBody>
+      </p:sp>
+      <p:sp>
+        <p:nvSpPr>
+          <p:cNvPr id="2" name="TextBox 1">
+            <a:extLst>
+              <a:ext uri="{FF2B5EF4-FFF2-40B4-BE49-F238E27FC236}">
+                <a16:creationId xmlns:a16="http://schemas.microsoft.com/office/drawing/2014/main" id="{B62BC137-24A8-F44E-B9FA-E81F095DA3A8}"/>
+              </a:ext>
+            </a:extLst>
+          </p:cNvPr>
+          <p:cNvSpPr txBox="1"/>
+          <p:nvPr/>
+        </p:nvSpPr>
+        <p:spPr>
+          <a:xfrm>
+            <a:off x="6376163" y="4692260"/>
+            <a:ext cx="357790" cy="369332"/>
+          </a:xfrm>
+          <a:prstGeom prst="rect">
+            <a:avLst/>
+          </a:prstGeom>
+          <a:noFill/>
+        </p:spPr>
+        <p:txBody>
+          <a:bodyPr wrap="none" rtlCol="0">
+            <a:spAutoFit/>
+          </a:bodyPr>
+          <a:lstStyle/>
+          <a:p>
+            <a:r>
+              <a:rPr lang="en-US" b="1" dirty="0">
+                <a:solidFill>
+                  <a:srgbClr val="7030A0"/>
+                </a:solidFill>
+              </a:rPr>
+              <a:t>✓</a:t>
+            </a:r>
+          </a:p>
+        </p:txBody>
+      </p:sp>
+      <p:sp>
+        <p:nvSpPr>
+          <p:cNvPr id="47" name="TextBox 46">
+            <a:extLst>
+              <a:ext uri="{FF2B5EF4-FFF2-40B4-BE49-F238E27FC236}">
+                <a16:creationId xmlns:a16="http://schemas.microsoft.com/office/drawing/2014/main" id="{DD9B5A9D-F88C-914F-9FD8-C8B55A620844}"/>
+              </a:ext>
+            </a:extLst>
+          </p:cNvPr>
+          <p:cNvSpPr txBox="1"/>
+          <p:nvPr/>
+        </p:nvSpPr>
+        <p:spPr>
+          <a:xfrm>
+            <a:off x="8148657" y="2633431"/>
+            <a:ext cx="357790" cy="369332"/>
+          </a:xfrm>
+          <a:prstGeom prst="rect">
+            <a:avLst/>
+          </a:prstGeom>
+          <a:noFill/>
+        </p:spPr>
+        <p:txBody>
+          <a:bodyPr wrap="none" rtlCol="0">
+            <a:spAutoFit/>
+          </a:bodyPr>
+          <a:lstStyle/>
+          <a:p>
+            <a:r>
+              <a:rPr lang="en-US" b="1" dirty="0">
+                <a:solidFill>
+                  <a:srgbClr val="7030A0"/>
+                </a:solidFill>
+              </a:rPr>
+              <a:t>✓</a:t>
             </a:r>
           </a:p>
         </p:txBody>
@@ -22752,14 +22891,14 @@
           <p:nvPr>
             <p:extLst>
               <p:ext uri="{D42A27DB-BD31-4B8C-83A1-F6EECF244321}">
-                <p14:modId xmlns:p14="http://schemas.microsoft.com/office/powerpoint/2010/main" val="3101540739"/>
+                <p14:modId xmlns:p14="http://schemas.microsoft.com/office/powerpoint/2010/main" val="1989733922"/>
               </p:ext>
             </p:extLst>
           </p:nvPr>
         </p:nvGraphicFramePr>
         <p:xfrm>
           <a:off x="316470" y="525554"/>
-          <a:ext cx="8396837" cy="4761606"/>
+          <a:ext cx="8396837" cy="4840224"/>
         </p:xfrm>
         <a:graphic>
           <a:graphicData uri="http://schemas.openxmlformats.org/drawingml/2006/table">
@@ -22804,7 +22943,7 @@
                   </a:extLst>
                 </a:gridCol>
               </a:tblGrid>
-              <a:tr h="191766">
+              <a:tr h="129053">
                 <a:tc>
                   <a:txBody>
                     <a:bodyPr/>
@@ -22812,7 +22951,7 @@
                     <a:p>
                       <a:pPr algn="ctr"/>
                       <a:r>
-                        <a:rPr lang="en-US" sz="900" dirty="0"/>
+                        <a:rPr lang="en-US" sz="1000" dirty="0"/>
                         <a:t>Query</a:t>
                       </a:r>
                     </a:p>
@@ -22826,7 +22965,7 @@
                     <a:p>
                       <a:pPr algn="ctr"/>
                       <a:r>
-                        <a:rPr lang="en-US" sz="900" dirty="0"/>
+                        <a:rPr lang="en-US" sz="1000" dirty="0"/>
                         <a:t>Input</a:t>
                       </a:r>
                     </a:p>
@@ -22840,7 +22979,7 @@
                     <a:p>
                       <a:pPr algn="ctr"/>
                       <a:r>
-                        <a:rPr lang="en-US" sz="900" dirty="0"/>
+                        <a:rPr lang="en-US" sz="1000" dirty="0"/>
                         <a:t>Success Results</a:t>
                       </a:r>
                     </a:p>
@@ -22854,7 +22993,7 @@
                     <a:p>
                       <a:pPr algn="ctr"/>
                       <a:r>
-                        <a:rPr lang="en-US" sz="900" dirty="0"/>
+                        <a:rPr lang="en-US" sz="1000" dirty="0"/>
                         <a:t>Fail Results(*)</a:t>
                       </a:r>
                     </a:p>
@@ -22868,11 +23007,11 @@
                     <a:p>
                       <a:pPr algn="ctr"/>
                       <a:r>
-                        <a:rPr lang="en-US" sz="900" dirty="0"/>
+                        <a:rPr lang="en-US" sz="1000" dirty="0"/>
                         <a:t>Notes</a:t>
                       </a:r>
                       <a:r>
-                        <a:rPr lang="en-US" sz="900" baseline="30000" dirty="0"/>
+                        <a:rPr lang="en-US" sz="1000" baseline="30000" dirty="0"/>
                         <a:t>(1)</a:t>
                       </a:r>
                     </a:p>
@@ -22885,14 +23024,14 @@
                   </a:ext>
                 </a:extLst>
               </a:tr>
-              <a:tr h="191766">
+              <a:tr h="129053">
                 <a:tc>
                   <a:txBody>
                     <a:bodyPr/>
                     <a:lstStyle/>
                     <a:p>
                       <a:r>
-                        <a:rPr lang="en-US" sz="900" dirty="0"/>
+                        <a:rPr lang="en-US" sz="1000" dirty="0"/>
                         <a:t>time</a:t>
                       </a:r>
                     </a:p>
@@ -22905,7 +23044,7 @@
                     <a:lstStyle/>
                     <a:p>
                       <a:r>
-                        <a:rPr lang="en-US" sz="900" dirty="0"/>
+                        <a:rPr lang="en-US" sz="1000" dirty="0"/>
                         <a:t>n/a</a:t>
                       </a:r>
                     </a:p>
@@ -22918,15 +23057,15 @@
                     <a:lstStyle/>
                     <a:p>
                       <a:r>
-                        <a:rPr lang="en-US" sz="900" dirty="0"/>
+                        <a:rPr lang="en-US" sz="1000" dirty="0"/>
                         <a:t>server </a:t>
                       </a:r>
                       <a:r>
-                        <a:rPr lang="en-US" sz="900" dirty="0" err="1"/>
+                        <a:rPr lang="en-US" sz="1000" dirty="0" err="1"/>
                         <a:t>unix</a:t>
                       </a:r>
                       <a:r>
-                        <a:rPr lang="en-US" sz="900" dirty="0"/>
+                        <a:rPr lang="en-US" sz="1000" dirty="0"/>
                         <a:t> time</a:t>
                       </a:r>
                     </a:p>
@@ -22938,7 +23077,7 @@
                     <a:bodyPr/>
                     <a:lstStyle/>
                     <a:p>
-                      <a:endParaRPr lang="en-US" sz="900" dirty="0"/>
+                      <a:endParaRPr lang="en-US" sz="1000" dirty="0"/>
                     </a:p>
                   </a:txBody>
                   <a:tcPr marL="45720" marR="45720" marT="27432" marB="27432"/>
@@ -22948,7 +23087,7 @@
                     <a:bodyPr/>
                     <a:lstStyle/>
                     <a:p>
-                      <a:endParaRPr lang="en-US" sz="900" dirty="0"/>
+                      <a:endParaRPr lang="en-US" sz="1000" dirty="0"/>
                     </a:p>
                   </a:txBody>
                   <a:tcPr marL="45720" marR="45720" marT="27432" marB="27432"/>
@@ -22959,22 +23098,22 @@
                   </a:ext>
                 </a:extLst>
               </a:tr>
-              <a:tr h="332771">
+              <a:tr h="200226">
                 <a:tc>
                   <a:txBody>
                     <a:bodyPr/>
                     <a:lstStyle/>
                     <a:p>
                       <a:r>
-                        <a:rPr lang="en-US" sz="900" dirty="0"/>
+                        <a:rPr lang="en-US" sz="1000" dirty="0"/>
                         <a:t>connect</a:t>
                       </a:r>
                       <a:r>
-                        <a:rPr lang="en-US" sz="900" baseline="30000" dirty="0"/>
+                        <a:rPr lang="en-US" sz="1000" baseline="30000" dirty="0"/>
                         <a:t>(2)</a:t>
                       </a:r>
                       <a:r>
-                        <a:rPr lang="en-US" sz="900" dirty="0"/>
+                        <a:rPr lang="en-US" sz="1000" dirty="0"/>
                         <a:t>(F)</a:t>
                       </a:r>
                     </a:p>
@@ -22987,10 +23126,10 @@
                     <a:lstStyle/>
                     <a:p>
                       <a:r>
-                        <a:rPr lang="en-US" sz="900" dirty="0" err="1"/>
+                        <a:rPr lang="en-US" sz="1000" dirty="0" err="1"/>
                         <a:t>fbid</a:t>
                       </a:r>
-                      <a:endParaRPr lang="en-US" sz="900" dirty="0"/>
+                      <a:endParaRPr lang="en-US" sz="1000" dirty="0"/>
                     </a:p>
                   </a:txBody>
                   <a:tcPr marL="45720" marR="45720" marT="27432" marB="27432"/>
@@ -23001,20 +23140,12 @@
                     <a:lstStyle/>
                     <a:p>
                       <a:r>
-                        <a:rPr lang="en-US" sz="900" dirty="0" err="1"/>
+                        <a:rPr lang="en-US" sz="1000" dirty="0" err="1"/>
                         <a:t>userkey</a:t>
                       </a:r>
                       <a:r>
-                        <a:rPr lang="en-US" sz="900" dirty="0"/>
-                        <a:t>, [username=1],[</a:t>
-                      </a:r>
-                      <a:r>
-                        <a:rPr lang="en-US" sz="900" dirty="0" err="1"/>
-                        <a:t>last_loss</a:t>
-                      </a:r>
-                      <a:r>
-                        <a:rPr lang="en-US" sz="900" dirty="0"/>
-                        <a:t>]</a:t>
+                        <a:rPr lang="en-US" sz="1000" dirty="0"/>
+                        <a:t>, [username=1]</a:t>
                       </a:r>
                     </a:p>
                   </a:txBody>
@@ -23025,7 +23156,7 @@
                     <a:bodyPr/>
                     <a:lstStyle/>
                     <a:p>
-                      <a:endParaRPr lang="en-US" sz="900" dirty="0"/>
+                      <a:endParaRPr lang="en-US" sz="1000" dirty="0"/>
                     </a:p>
                   </a:txBody>
                   <a:tcPr marL="45720" marR="45720" marT="27432" marB="27432"/>
@@ -23036,7 +23167,7 @@
                     <a:lstStyle/>
                     <a:p>
                       <a:r>
-                        <a:rPr lang="en-US" sz="900" dirty="0"/>
+                        <a:rPr lang="en-US" sz="1000" dirty="0"/>
                         <a:t>creates FB entry if needed</a:t>
                       </a:r>
                     </a:p>
@@ -23049,22 +23180,22 @@
                   </a:ext>
                 </a:extLst>
               </a:tr>
-              <a:tr h="332771">
+              <a:tr h="221233">
                 <a:tc>
                   <a:txBody>
                     <a:bodyPr/>
                     <a:lstStyle/>
                     <a:p>
                       <a:r>
-                        <a:rPr lang="en-US" sz="900" dirty="0"/>
+                        <a:rPr lang="en-US" sz="1000" dirty="0"/>
                         <a:t>connect</a:t>
                       </a:r>
                       <a:r>
-                        <a:rPr lang="en-US" sz="900" baseline="30000" dirty="0"/>
+                        <a:rPr lang="en-US" sz="1000" baseline="30000" dirty="0"/>
                         <a:t>(2)</a:t>
                       </a:r>
                       <a:r>
-                        <a:rPr lang="en-US" sz="900" dirty="0"/>
+                        <a:rPr lang="en-US" sz="1000" dirty="0"/>
                         <a:t>(F,K)</a:t>
                       </a:r>
                     </a:p>
@@ -23077,18 +23208,18 @@
                     <a:lstStyle/>
                     <a:p>
                       <a:r>
-                        <a:rPr lang="en-US" sz="900" dirty="0" err="1"/>
+                        <a:rPr lang="en-US" sz="1000" dirty="0" err="1"/>
                         <a:t>userkey</a:t>
                       </a:r>
                       <a:r>
-                        <a:rPr lang="en-US" sz="900" dirty="0"/>
+                        <a:rPr lang="en-US" sz="1000" dirty="0"/>
                         <a:t>, </a:t>
                       </a:r>
                       <a:r>
-                        <a:rPr lang="en-US" sz="900" dirty="0" err="1"/>
+                        <a:rPr lang="en-US" sz="1000" dirty="0" err="1"/>
                         <a:t>fbid</a:t>
                       </a:r>
-                      <a:endParaRPr lang="en-US" sz="900" dirty="0"/>
+                      <a:endParaRPr lang="en-US" sz="1000" dirty="0"/>
                     </a:p>
                   </a:txBody>
                   <a:tcPr marL="45720" marR="45720" marT="27432" marB="27432"/>
@@ -23099,16 +23230,8 @@
                     <a:lstStyle/>
                     <a:p>
                       <a:r>
-                        <a:rPr lang="en-US" sz="900" dirty="0"/>
-                        <a:t>[username=1],[</a:t>
-                      </a:r>
-                      <a:r>
-                        <a:rPr lang="en-US" sz="900" dirty="0" err="1"/>
-                        <a:t>last_loss</a:t>
-                      </a:r>
-                      <a:r>
-                        <a:rPr lang="en-US" sz="900" dirty="0"/>
-                        <a:t>]</a:t>
+                        <a:rPr lang="en-US" sz="1000" dirty="0"/>
+                        <a:t>[username=1]</a:t>
                       </a:r>
                     </a:p>
                   </a:txBody>
@@ -23120,33 +23243,33 @@
                     <a:lstStyle/>
                     <a:p>
                       <a:r>
-                        <a:rPr lang="en-US" sz="900" dirty="0"/>
+                        <a:rPr lang="en-US" sz="1000" dirty="0"/>
                         <a:t>Invalid </a:t>
                       </a:r>
                       <a:r>
-                        <a:rPr lang="en-US" sz="900" dirty="0" err="1"/>
+                        <a:rPr lang="en-US" sz="1000" dirty="0" err="1"/>
                         <a:t>userkey</a:t>
                       </a:r>
-                      <a:endParaRPr lang="en-US" sz="900" dirty="0"/>
+                      <a:endParaRPr lang="en-US" sz="1000" dirty="0"/>
                     </a:p>
                     <a:p>
                       <a:r>
-                        <a:rPr lang="en-US" sz="900" dirty="0"/>
+                        <a:rPr lang="en-US" sz="1000" dirty="0"/>
                         <a:t>invalid </a:t>
                       </a:r>
                       <a:r>
-                        <a:rPr lang="en-US" sz="900" dirty="0" err="1"/>
+                        <a:rPr lang="en-US" sz="1000" dirty="0" err="1"/>
                         <a:t>userkey</a:t>
                       </a:r>
                       <a:r>
-                        <a:rPr lang="en-US" sz="900" dirty="0"/>
+                        <a:rPr lang="en-US" sz="1000" dirty="0"/>
                         <a:t>/</a:t>
                       </a:r>
                       <a:r>
-                        <a:rPr lang="en-US" sz="900" dirty="0" err="1"/>
+                        <a:rPr lang="en-US" sz="1000" dirty="0" err="1"/>
                         <a:t>fbid</a:t>
                       </a:r>
-                      <a:endParaRPr lang="en-US" sz="900" dirty="0"/>
+                      <a:endParaRPr lang="en-US" sz="1000" dirty="0"/>
                     </a:p>
                   </a:txBody>
                   <a:tcPr marL="45720" marR="45720" marT="27432" marB="27432"/>
@@ -23174,7 +23297,7 @@
                         <a:defRPr/>
                       </a:pPr>
                       <a:r>
-                        <a:rPr lang="en-US" sz="900" dirty="0"/>
+                        <a:rPr lang="en-US" sz="1000" dirty="0"/>
                         <a:t>creates FB entry if needed</a:t>
                       </a:r>
                     </a:p>
@@ -23187,22 +23310,22 @@
                   </a:ext>
                 </a:extLst>
               </a:tr>
-              <a:tr h="191766">
+              <a:tr h="129053">
                 <a:tc>
                   <a:txBody>
                     <a:bodyPr/>
                     <a:lstStyle/>
                     <a:p>
                       <a:r>
-                        <a:rPr lang="en-US" sz="900" dirty="0"/>
+                        <a:rPr lang="en-US" sz="1000" dirty="0"/>
                         <a:t>validate</a:t>
                       </a:r>
                       <a:r>
-                        <a:rPr lang="en-US" sz="900" baseline="30000" dirty="0"/>
+                        <a:rPr lang="en-US" sz="1000" baseline="30000" dirty="0"/>
                         <a:t>(3)</a:t>
                       </a:r>
                       <a:r>
-                        <a:rPr lang="en-US" sz="900" dirty="0"/>
+                        <a:rPr lang="en-US" sz="1000" dirty="0"/>
                         <a:t>(K)</a:t>
                       </a:r>
                     </a:p>
@@ -23215,10 +23338,20 @@
                     <a:lstStyle/>
                     <a:p>
                       <a:r>
-                        <a:rPr lang="en-US" sz="900" dirty="0" err="1"/>
+                        <a:rPr lang="en-US" sz="1000" dirty="0" err="1"/>
                         <a:t>userkey</a:t>
                       </a:r>
-                      <a:endParaRPr lang="en-US" sz="900" dirty="0"/>
+                      <a:endParaRPr lang="en-US" sz="1000" dirty="0"/>
+                    </a:p>
+                  </a:txBody>
+                  <a:tcPr marL="45720" marR="45720" marT="27432" marB="27432"/>
+                </a:tc>
+                <a:tc>
+                  <a:txBody>
+                    <a:bodyPr/>
+                    <a:lstStyle/>
+                    <a:p>
+                      <a:endParaRPr lang="en-US" sz="1000" dirty="0"/>
                     </a:p>
                   </a:txBody>
                   <a:tcPr marL="45720" marR="45720" marT="27432" marB="27432"/>
@@ -23229,28 +23362,7 @@
                     <a:lstStyle/>
                     <a:p>
                       <a:r>
-                        <a:rPr lang="en-US" sz="900" dirty="0"/>
-                        <a:t>[</a:t>
-                      </a:r>
-                      <a:r>
-                        <a:rPr lang="en-US" sz="900" dirty="0" err="1"/>
-                        <a:t>last_loss</a:t>
-                      </a:r>
-                      <a:r>
-                        <a:rPr lang="en-US" sz="900" dirty="0"/>
-                        <a:t>]</a:t>
-                      </a:r>
-                    </a:p>
-                  </a:txBody>
-                  <a:tcPr marL="45720" marR="45720" marT="27432" marB="27432"/>
-                </a:tc>
-                <a:tc>
-                  <a:txBody>
-                    <a:bodyPr/>
-                    <a:lstStyle/>
-                    <a:p>
-                      <a:r>
-                        <a:rPr lang="en-US" sz="900" dirty="0"/>
+                        <a:rPr lang="en-US" sz="1000" dirty="0"/>
                         <a:t>does not exist</a:t>
                       </a:r>
                     </a:p>
@@ -23262,7 +23374,7 @@
                     <a:bodyPr/>
                     <a:lstStyle/>
                     <a:p>
-                      <a:endParaRPr lang="en-US" sz="900" dirty="0"/>
+                      <a:endParaRPr lang="en-US" sz="1000" dirty="0"/>
                     </a:p>
                   </a:txBody>
                   <a:tcPr marL="45720" marR="45720" marT="27432" marB="27432"/>
@@ -23273,22 +23385,22 @@
                   </a:ext>
                 </a:extLst>
               </a:tr>
-              <a:tr h="332771">
+              <a:tr h="200226">
                 <a:tc>
                   <a:txBody>
                     <a:bodyPr/>
                     <a:lstStyle/>
                     <a:p>
                       <a:r>
-                        <a:rPr lang="en-US" sz="900" dirty="0"/>
+                        <a:rPr lang="en-US" sz="1000" dirty="0"/>
                         <a:t>validate</a:t>
                       </a:r>
                       <a:r>
-                        <a:rPr lang="en-US" sz="900" baseline="30000" dirty="0"/>
+                        <a:rPr lang="en-US" sz="1000" baseline="30000" dirty="0"/>
                         <a:t>(3) </a:t>
                       </a:r>
                       <a:r>
-                        <a:rPr lang="en-US" sz="900" dirty="0"/>
+                        <a:rPr lang="en-US" sz="1000" dirty="0"/>
                         <a:t>(U)</a:t>
                       </a:r>
                     </a:p>
@@ -23301,7 +23413,7 @@
                     <a:lstStyle/>
                     <a:p>
                       <a:r>
-                        <a:rPr lang="en-US" sz="900" dirty="0"/>
+                        <a:rPr lang="en-US" sz="1000" dirty="0"/>
                         <a:t>username, password</a:t>
                       </a:r>
                     </a:p>
@@ -23314,20 +23426,12 @@
                     <a:lstStyle/>
                     <a:p>
                       <a:r>
-                        <a:rPr lang="en-US" sz="900" dirty="0" err="1"/>
+                        <a:rPr lang="en-US" sz="1000" dirty="0" err="1"/>
                         <a:t>userkey</a:t>
                       </a:r>
                       <a:r>
-                        <a:rPr lang="en-US" sz="900" dirty="0"/>
-                        <a:t>, [alias], [email], [</a:t>
-                      </a:r>
-                      <a:r>
-                        <a:rPr lang="en-US" sz="900" dirty="0" err="1"/>
-                        <a:t>last_loss</a:t>
-                      </a:r>
-                      <a:r>
-                        <a:rPr lang="en-US" sz="900" dirty="0"/>
-                        <a:t>]</a:t>
+                        <a:rPr lang="en-US" sz="1000" dirty="0"/>
+                        <a:t>, [alias], [email]</a:t>
                       </a:r>
                     </a:p>
                   </a:txBody>
@@ -23356,29 +23460,9 @@
                         <a:defRPr/>
                       </a:pPr>
                       <a:r>
-                        <a:rPr lang="en-US" sz="900" dirty="0"/>
+                        <a:rPr lang="en-US" sz="1000" dirty="0"/>
                         <a:t>does not exist</a:t>
                       </a:r>
-                    </a:p>
-                    <a:p>
-                      <a:pPr marL="0" marR="0" lvl="0" indent="0" algn="l" defTabSz="914400" rtl="0" eaLnBrk="1" fontAlgn="auto" latinLnBrk="0" hangingPunct="1">
-                        <a:lnSpc>
-                          <a:spcPct val="100000"/>
-                        </a:lnSpc>
-                        <a:spcBef>
-                          <a:spcPts val="0"/>
-                        </a:spcBef>
-                        <a:spcAft>
-                          <a:spcPts val="0"/>
-                        </a:spcAft>
-                        <a:buClrTx/>
-                        <a:buSzTx/>
-                        <a:buFontTx/>
-                        <a:buNone/>
-                        <a:tabLst/>
-                        <a:defRPr/>
-                      </a:pPr>
-                      <a:endParaRPr lang="en-US" sz="900" dirty="0"/>
                     </a:p>
                   </a:txBody>
                   <a:tcPr marL="45720" marR="45720" marT="27432" marB="27432"/>
@@ -23405,7 +23489,7 @@
                         <a:tabLst/>
                         <a:defRPr/>
                       </a:pPr>
-                      <a:endParaRPr lang="en-US" sz="900" dirty="0"/>
+                      <a:endParaRPr lang="en-US" sz="1000" dirty="0"/>
                     </a:p>
                   </a:txBody>
                   <a:tcPr marL="45720" marR="45720" marT="27432" marB="27432"/>
@@ -23416,22 +23500,22 @@
                   </a:ext>
                 </a:extLst>
               </a:tr>
-              <a:tr h="332771">
+              <a:tr h="221233">
                 <a:tc>
                   <a:txBody>
                     <a:bodyPr/>
                     <a:lstStyle/>
                     <a:p>
                       <a:r>
-                        <a:rPr lang="en-US" sz="900" dirty="0"/>
+                        <a:rPr lang="en-US" sz="1000" dirty="0"/>
                         <a:t>validate</a:t>
                       </a:r>
                       <a:r>
-                        <a:rPr lang="en-US" sz="900" baseline="30000" dirty="0"/>
+                        <a:rPr lang="en-US" sz="1000" baseline="30000" dirty="0"/>
                         <a:t>(3)</a:t>
                       </a:r>
                       <a:r>
-                        <a:rPr lang="en-US" sz="900" dirty="0"/>
+                        <a:rPr lang="en-US" sz="1000" dirty="0"/>
                         <a:t>(U;K)</a:t>
                       </a:r>
                     </a:p>
@@ -23444,14 +23528,14 @@
                     <a:lstStyle/>
                     <a:p>
                       <a:r>
-                        <a:rPr lang="en-US" sz="900" dirty="0"/>
+                        <a:rPr lang="en-US" sz="1000" dirty="0"/>
                         <a:t>username, password, </a:t>
                       </a:r>
                       <a:r>
-                        <a:rPr lang="en-US" sz="900" dirty="0" err="1"/>
+                        <a:rPr lang="en-US" sz="1000" dirty="0" err="1"/>
                         <a:t>userkey</a:t>
                       </a:r>
-                      <a:endParaRPr lang="en-US" sz="900" dirty="0"/>
+                      <a:endParaRPr lang="en-US" sz="1000" dirty="0"/>
                     </a:p>
                   </a:txBody>
                   <a:tcPr marL="45720" marR="45720" marT="27432" marB="27432"/>
@@ -23462,16 +23546,8 @@
                     <a:lstStyle/>
                     <a:p>
                       <a:r>
-                        <a:rPr lang="en-US" sz="900" dirty="0"/>
-                        <a:t>[alias], [email], [</a:t>
-                      </a:r>
-                      <a:r>
-                        <a:rPr lang="en-US" sz="900" dirty="0" err="1"/>
-                        <a:t>last_loss</a:t>
-                      </a:r>
-                      <a:r>
-                        <a:rPr lang="en-US" sz="900" dirty="0"/>
-                        <a:t>]</a:t>
+                        <a:rPr lang="en-US" sz="1000" dirty="0"/>
+                        <a:t>[alias], [email]</a:t>
                       </a:r>
                     </a:p>
                   </a:txBody>
@@ -23500,28 +23576,28 @@
                         <a:defRPr/>
                       </a:pPr>
                       <a:r>
-                        <a:rPr lang="en-US" sz="900" dirty="0"/>
+                        <a:rPr lang="en-US" sz="1000" dirty="0"/>
                         <a:t>incorrect username: [</a:t>
                       </a:r>
                       <a:r>
-                        <a:rPr lang="en-US" sz="900" dirty="0" err="1"/>
+                        <a:rPr lang="en-US" sz="1000" dirty="0" err="1"/>
                         <a:t>email_status</a:t>
                       </a:r>
                       <a:r>
-                        <a:rPr lang="en-US" sz="900" dirty="0"/>
+                        <a:rPr lang="en-US" sz="1000" dirty="0"/>
                         <a:t>]</a:t>
                       </a:r>
                     </a:p>
                     <a:p>
                       <a:r>
-                        <a:rPr lang="en-US" sz="900" dirty="0"/>
+                        <a:rPr lang="en-US" sz="1000" dirty="0"/>
                         <a:t>invalid </a:t>
                       </a:r>
                       <a:r>
-                        <a:rPr lang="en-US" sz="900" dirty="0" err="1"/>
+                        <a:rPr lang="en-US" sz="1000" dirty="0" err="1"/>
                         <a:t>userkey</a:t>
                       </a:r>
-                      <a:endParaRPr lang="en-US" sz="900" dirty="0"/>
+                      <a:endParaRPr lang="en-US" sz="1000" dirty="0"/>
                     </a:p>
                   </a:txBody>
                   <a:tcPr marL="45720" marR="45720" marT="27432" marB="27432"/>
@@ -23548,7 +23624,7 @@
                         <a:tabLst/>
                         <a:defRPr/>
                       </a:pPr>
-                      <a:endParaRPr lang="en-US" sz="900" dirty="0"/>
+                      <a:endParaRPr lang="en-US" sz="1000" dirty="0"/>
                     </a:p>
                   </a:txBody>
                   <a:tcPr marL="45720" marR="45720" marT="27432" marB="27432"/>
@@ -23559,22 +23635,22 @@
                   </a:ext>
                 </a:extLst>
               </a:tr>
-              <a:tr h="332771">
+              <a:tr h="200226">
                 <a:tc>
                   <a:txBody>
                     <a:bodyPr/>
                     <a:lstStyle/>
                     <a:p>
                       <a:r>
-                        <a:rPr lang="en-US" sz="900" dirty="0"/>
+                        <a:rPr lang="en-US" sz="1000" dirty="0"/>
                         <a:t>create</a:t>
                       </a:r>
                       <a:r>
-                        <a:rPr lang="en-US" sz="900" baseline="30000" dirty="0"/>
+                        <a:rPr lang="en-US" sz="1000" baseline="30000" dirty="0"/>
                         <a:t>(4)</a:t>
                       </a:r>
                       <a:r>
-                        <a:rPr lang="en-US" sz="900" dirty="0"/>
+                        <a:rPr lang="en-US" sz="1000" dirty="0"/>
                         <a:t>(U)</a:t>
                       </a:r>
                     </a:p>
@@ -23587,7 +23663,7 @@
                     <a:lstStyle/>
                     <a:p>
                       <a:r>
-                        <a:rPr lang="en-US" sz="900" dirty="0"/>
+                        <a:rPr lang="en-US" sz="1000" dirty="0"/>
                         <a:t>username, password, [alias], [email]</a:t>
                       </a:r>
                     </a:p>
@@ -23600,10 +23676,10 @@
                     <a:lstStyle/>
                     <a:p>
                       <a:r>
-                        <a:rPr lang="en-US" sz="900" dirty="0" err="1"/>
+                        <a:rPr lang="en-US" sz="1000" dirty="0" err="1"/>
                         <a:t>userkey</a:t>
                       </a:r>
-                      <a:endParaRPr lang="en-US" sz="900" dirty="0"/>
+                      <a:endParaRPr lang="en-US" sz="1000" dirty="0"/>
                     </a:p>
                   </a:txBody>
                   <a:tcPr marL="45720" marR="45720" marT="27432" marB="27432"/>
@@ -23614,15 +23690,15 @@
                     <a:lstStyle/>
                     <a:p>
                       <a:r>
-                        <a:rPr lang="en-US" sz="900" dirty="0"/>
+                        <a:rPr lang="en-US" sz="1000" dirty="0"/>
                         <a:t>exists: [</a:t>
                       </a:r>
                       <a:r>
-                        <a:rPr lang="en-US" sz="900" dirty="0" err="1"/>
+                        <a:rPr lang="en-US" sz="1000" dirty="0" err="1"/>
                         <a:t>email_status</a:t>
                       </a:r>
                       <a:r>
-                        <a:rPr lang="en-US" sz="900" dirty="0"/>
+                        <a:rPr lang="en-US" sz="1000" dirty="0"/>
                         <a:t>]</a:t>
                       </a:r>
                     </a:p>
@@ -23634,7 +23710,7 @@
                     <a:bodyPr/>
                     <a:lstStyle/>
                     <a:p>
-                      <a:endParaRPr lang="en-US" sz="900" dirty="0"/>
+                      <a:endParaRPr lang="en-US" sz="1000" dirty="0"/>
                     </a:p>
                   </a:txBody>
                   <a:tcPr marL="45720" marR="45720" marT="27432" marB="27432"/>
@@ -23645,14 +23721,14 @@
                   </a:ext>
                 </a:extLst>
               </a:tr>
-              <a:tr h="332771">
+              <a:tr h="221233">
                 <a:tc>
                   <a:txBody>
                     <a:bodyPr/>
                     <a:lstStyle/>
                     <a:p>
                       <a:r>
-                        <a:rPr lang="en-US" sz="900" dirty="0"/>
+                        <a:rPr lang="en-US" sz="1000" dirty="0"/>
                         <a:t>email U</a:t>
                       </a:r>
                     </a:p>
@@ -23665,10 +23741,10 @@
                     <a:lstStyle/>
                     <a:p>
                       <a:r>
-                        <a:rPr lang="en-US" sz="900" dirty="0" err="1"/>
+                        <a:rPr lang="en-US" sz="1000" dirty="0" err="1"/>
                         <a:t>userkey|username</a:t>
                       </a:r>
-                      <a:endParaRPr lang="en-US" sz="900" dirty="0"/>
+                      <a:endParaRPr lang="en-US" sz="1000" dirty="0"/>
                     </a:p>
                   </a:txBody>
                   <a:tcPr marL="45720" marR="45720" marT="27432" marB="27432"/>
@@ -23678,7 +23754,7 @@
                     <a:bodyPr/>
                     <a:lstStyle/>
                     <a:p>
-                      <a:endParaRPr lang="en-US" sz="900" dirty="0"/>
+                      <a:endParaRPr lang="en-US" sz="1000" dirty="0"/>
                     </a:p>
                   </a:txBody>
                   <a:tcPr marL="45720" marR="45720" marT="27432" marB="27432"/>
@@ -23689,29 +23765,29 @@
                     <a:lstStyle/>
                     <a:p>
                       <a:r>
-                        <a:rPr lang="en-US" sz="900" dirty="0"/>
+                        <a:rPr lang="en-US" sz="1000" dirty="0"/>
                         <a:t>invalid </a:t>
                       </a:r>
                       <a:r>
-                        <a:rPr lang="en-US" sz="900" dirty="0" err="1"/>
+                        <a:rPr lang="en-US" sz="1000" dirty="0" err="1"/>
                         <a:t>userkey</a:t>
                       </a:r>
                       <a:r>
-                        <a:rPr lang="en-US" sz="900" dirty="0"/>
+                        <a:rPr lang="en-US" sz="1000" dirty="0"/>
                         <a:t>, invalid username</a:t>
                       </a:r>
                     </a:p>
                     <a:p>
                       <a:r>
-                        <a:rPr lang="en-US" sz="900" dirty="0"/>
+                        <a:rPr lang="en-US" sz="1000" dirty="0"/>
                         <a:t>no email: [</a:t>
                       </a:r>
                       <a:r>
-                        <a:rPr lang="en-US" sz="900" dirty="0" err="1"/>
+                        <a:rPr lang="en-US" sz="1000" dirty="0" err="1"/>
                         <a:t>email_status</a:t>
                       </a:r>
                       <a:r>
-                        <a:rPr lang="en-US" sz="900" dirty="0"/>
+                        <a:rPr lang="en-US" sz="1000" dirty="0"/>
                         <a:t>]</a:t>
                       </a:r>
                     </a:p>
@@ -23723,7 +23799,7 @@
                     <a:bodyPr/>
                     <a:lstStyle/>
                     <a:p>
-                      <a:endParaRPr lang="en-US" sz="900" dirty="0"/>
+                      <a:endParaRPr lang="en-US" sz="1000" dirty="0"/>
                     </a:p>
                   </a:txBody>
                   <a:tcPr marL="45720" marR="45720" marT="27432" marB="27432"/>
@@ -23734,14 +23810,14 @@
                   </a:ext>
                 </a:extLst>
               </a:tr>
-              <a:tr h="332771">
+              <a:tr h="221233">
                 <a:tc>
                   <a:txBody>
                     <a:bodyPr/>
                     <a:lstStyle/>
                     <a:p>
                       <a:r>
-                        <a:rPr lang="en-US" sz="900" dirty="0"/>
+                        <a:rPr lang="en-US" sz="1000" dirty="0"/>
                         <a:t>drop</a:t>
                       </a:r>
                     </a:p>
@@ -23754,15 +23830,15 @@
                     <a:lstStyle/>
                     <a:p>
                       <a:r>
-                        <a:rPr lang="en-US" sz="900" dirty="0" err="1"/>
+                        <a:rPr lang="en-US" sz="1000" dirty="0" err="1"/>
                         <a:t>userkey,scope</a:t>
                       </a:r>
                       <a:r>
-                        <a:rPr lang="en-US" sz="900" baseline="30000" dirty="0"/>
+                        <a:rPr lang="en-US" sz="1000" baseline="30000" dirty="0"/>
                         <a:t>(5)</a:t>
                       </a:r>
                       <a:r>
-                        <a:rPr lang="en-US" sz="900" dirty="0"/>
+                        <a:rPr lang="en-US" sz="1000" dirty="0"/>
                         <a:t>,[notify]</a:t>
                       </a:r>
                     </a:p>
@@ -23775,23 +23851,23 @@
                     <a:lstStyle/>
                     <a:p>
                       <a:r>
-                        <a:rPr lang="en-US" sz="900" dirty="0"/>
+                        <a:rPr lang="en-US" sz="1000" dirty="0"/>
                         <a:t>[username=1],[</a:t>
                       </a:r>
                       <a:r>
-                        <a:rPr lang="en-US" sz="900" dirty="0" err="1"/>
+                        <a:rPr lang="en-US" sz="1000" dirty="0" err="1"/>
                         <a:t>fbid</a:t>
                       </a:r>
                       <a:r>
-                        <a:rPr lang="en-US" sz="900" dirty="0"/>
+                        <a:rPr lang="en-US" sz="1000" dirty="0"/>
                         <a:t>=1],[</a:t>
                       </a:r>
                       <a:r>
-                        <a:rPr lang="en-US" sz="900" dirty="0" err="1"/>
+                        <a:rPr lang="en-US" sz="1000" dirty="0" err="1"/>
                         <a:t>userkey</a:t>
                       </a:r>
                       <a:r>
-                        <a:rPr lang="en-US" sz="900" dirty="0"/>
+                        <a:rPr lang="en-US" sz="1000" dirty="0"/>
                         <a:t>=1]</a:t>
                       </a:r>
                     </a:p>
@@ -23821,14 +23897,14 @@
                         <a:defRPr/>
                       </a:pPr>
                       <a:r>
-                        <a:rPr lang="en-US" sz="900" dirty="0"/>
+                        <a:rPr lang="en-US" sz="1000" dirty="0"/>
                         <a:t>invalid </a:t>
                       </a:r>
                       <a:r>
-                        <a:rPr lang="en-US" sz="900" dirty="0" err="1"/>
+                        <a:rPr lang="en-US" sz="1000" dirty="0" err="1"/>
                         <a:t>userkey</a:t>
                       </a:r>
-                      <a:endParaRPr lang="en-US" sz="900" dirty="0"/>
+                      <a:endParaRPr lang="en-US" sz="1000" dirty="0"/>
                     </a:p>
                   </a:txBody>
                   <a:tcPr marL="45720" marR="45720" marT="27432" marB="27432"/>
@@ -23838,7 +23914,7 @@
                     <a:bodyPr/>
                     <a:lstStyle/>
                     <a:p>
-                      <a:endParaRPr lang="en-US" sz="900" dirty="0"/>
+                      <a:endParaRPr lang="en-US" sz="1000" dirty="0"/>
                     </a:p>
                   </a:txBody>
                   <a:tcPr marL="45720" marR="45720" marT="27432" marB="27432"/>
@@ -23849,14 +23925,14 @@
                   </a:ext>
                 </a:extLst>
               </a:tr>
-              <a:tr h="332771">
+              <a:tr h="221233">
                 <a:tc>
                   <a:txBody>
                     <a:bodyPr/>
                     <a:lstStyle/>
                     <a:p>
                       <a:r>
-                        <a:rPr lang="en-US" sz="900" dirty="0"/>
+                        <a:rPr lang="en-US" sz="1000" dirty="0"/>
                         <a:t>info</a:t>
                       </a:r>
                     </a:p>
@@ -23869,10 +23945,10 @@
                     <a:lstStyle/>
                     <a:p>
                       <a:r>
-                        <a:rPr lang="en-US" sz="900" dirty="0" err="1"/>
+                        <a:rPr lang="en-US" sz="1000" dirty="0" err="1"/>
                         <a:t>userkey</a:t>
                       </a:r>
-                      <a:endParaRPr lang="en-US" sz="900" dirty="0"/>
+                      <a:endParaRPr lang="en-US" sz="1000" dirty="0"/>
                     </a:p>
                   </a:txBody>
                   <a:tcPr marL="45720" marR="45720" marT="27432" marB="27432"/>
@@ -23883,23 +23959,23 @@
                     <a:lstStyle/>
                     <a:p>
                       <a:r>
-                        <a:rPr lang="en-US" sz="900" dirty="0"/>
+                        <a:rPr lang="en-US" sz="1000" dirty="0"/>
                         <a:t>[username=1, </a:t>
                       </a:r>
                       <a:r>
-                        <a:rPr lang="en-US" sz="900" dirty="0" err="1"/>
+                        <a:rPr lang="en-US" sz="1000" dirty="0" err="1"/>
                         <a:t>email_status</a:t>
                       </a:r>
                       <a:r>
-                        <a:rPr lang="en-US" sz="900" dirty="0"/>
+                        <a:rPr lang="en-US" sz="1000" dirty="0"/>
                         <a:t>], [</a:t>
                       </a:r>
                       <a:r>
-                        <a:rPr lang="en-US" sz="900" dirty="0" err="1"/>
+                        <a:rPr lang="en-US" sz="1000" dirty="0" err="1"/>
                         <a:t>fbid</a:t>
                       </a:r>
                       <a:r>
-                        <a:rPr lang="en-US" sz="900" dirty="0"/>
+                        <a:rPr lang="en-US" sz="1000" dirty="0"/>
                         <a:t>=1]</a:t>
                       </a:r>
                     </a:p>
@@ -23912,14 +23988,14 @@
                     <a:lstStyle/>
                     <a:p>
                       <a:r>
-                        <a:rPr lang="en-US" sz="900" dirty="0"/>
+                        <a:rPr lang="en-US" sz="1000" dirty="0"/>
                         <a:t>invalid </a:t>
                       </a:r>
                       <a:r>
-                        <a:rPr lang="en-US" sz="900" dirty="0" err="1"/>
+                        <a:rPr lang="en-US" sz="1000" dirty="0" err="1"/>
                         <a:t>userkey</a:t>
                       </a:r>
-                      <a:endParaRPr lang="en-US" sz="900" dirty="0"/>
+                      <a:endParaRPr lang="en-US" sz="1000" dirty="0"/>
                     </a:p>
                   </a:txBody>
                   <a:tcPr marL="45720" marR="45720" marT="27432" marB="27432"/>
@@ -23946,7 +24022,7 @@
                         <a:tabLst/>
                         <a:defRPr/>
                       </a:pPr>
-                      <a:endParaRPr lang="en-US" sz="900" dirty="0"/>
+                      <a:endParaRPr lang="en-US" sz="1000" dirty="0"/>
                     </a:p>
                   </a:txBody>
                   <a:tcPr marL="45720" marR="45720" marT="27432" marB="27432"/>
@@ -23957,14 +24033,14 @@
                   </a:ext>
                 </a:extLst>
               </a:tr>
-              <a:tr h="473776">
+              <a:tr h="313413">
                 <a:tc>
                   <a:txBody>
                     <a:bodyPr/>
                     <a:lstStyle/>
                     <a:p>
                       <a:r>
-                        <a:rPr lang="en-US" sz="900" dirty="0"/>
+                        <a:rPr lang="en-US" sz="1000" dirty="0"/>
                         <a:t>add(U)</a:t>
                       </a:r>
                     </a:p>
@@ -23994,11 +24070,11 @@
                         <a:defRPr/>
                       </a:pPr>
                       <a:r>
-                        <a:rPr lang="en-US" sz="900" dirty="0" err="1"/>
+                        <a:rPr lang="en-US" sz="1000" dirty="0" err="1"/>
                         <a:t>userkey</a:t>
                       </a:r>
                       <a:r>
-                        <a:rPr lang="en-US" sz="900" dirty="0"/>
+                        <a:rPr lang="en-US" sz="1000" dirty="0"/>
                         <a:t>, username, password, [alias], [email]</a:t>
                       </a:r>
                     </a:p>
@@ -24010,7 +24086,7 @@
                     <a:bodyPr/>
                     <a:lstStyle/>
                     <a:p>
-                      <a:endParaRPr lang="en-US" sz="900" dirty="0"/>
+                      <a:endParaRPr lang="en-US" sz="1000" dirty="0"/>
                     </a:p>
                   </a:txBody>
                   <a:tcPr marL="45720" marR="45720" marT="27432" marB="27432"/>
@@ -24021,7 +24097,7 @@
                     <a:lstStyle/>
                     <a:p>
                       <a:r>
-                        <a:rPr lang="en-US" sz="900" dirty="0"/>
+                        <a:rPr lang="en-US" sz="1000" dirty="0"/>
                         <a:t>exists</a:t>
                       </a:r>
                     </a:p>
@@ -24044,14 +24120,14 @@
                         <a:defRPr/>
                       </a:pPr>
                       <a:r>
-                        <a:rPr lang="en-US" sz="900" dirty="0"/>
+                        <a:rPr lang="en-US" sz="1000" dirty="0"/>
                         <a:t>invalid </a:t>
                       </a:r>
                       <a:r>
-                        <a:rPr lang="en-US" sz="900" dirty="0" err="1"/>
+                        <a:rPr lang="en-US" sz="1000" dirty="0" err="1"/>
                         <a:t>userkey</a:t>
                       </a:r>
-                      <a:endParaRPr lang="en-US" sz="900" dirty="0"/>
+                      <a:endParaRPr lang="en-US" sz="1000" dirty="0"/>
                     </a:p>
                   </a:txBody>
                   <a:tcPr marL="45720" marR="45720" marT="27432" marB="27432"/>
@@ -24079,15 +24155,15 @@
                         <a:defRPr/>
                       </a:pPr>
                       <a:r>
-                        <a:rPr lang="en-US" sz="900" dirty="0"/>
+                        <a:rPr lang="en-US" sz="1000" dirty="0"/>
                         <a:t>If username is already associated with </a:t>
                       </a:r>
                       <a:r>
-                        <a:rPr lang="en-US" sz="900" dirty="0" err="1"/>
+                        <a:rPr lang="en-US" sz="1000" dirty="0" err="1"/>
                         <a:t>userkey</a:t>
                       </a:r>
                       <a:r>
-                        <a:rPr lang="en-US" sz="900" dirty="0"/>
+                        <a:rPr lang="en-US" sz="1000" dirty="0"/>
                         <a:t>, updates password, email, and alias (success)</a:t>
                       </a:r>
                     </a:p>
@@ -24100,14 +24176,14 @@
                   </a:ext>
                 </a:extLst>
               </a:tr>
-              <a:tr h="332771">
+              <a:tr h="221233">
                 <a:tc>
                   <a:txBody>
                     <a:bodyPr/>
                     <a:lstStyle/>
                     <a:p>
                       <a:r>
-                        <a:rPr lang="en-US" sz="900" dirty="0"/>
+                        <a:rPr lang="en-US" sz="1000" dirty="0"/>
                         <a:t>add(F)</a:t>
                       </a:r>
                     </a:p>
@@ -24120,18 +24196,18 @@
                     <a:lstStyle/>
                     <a:p>
                       <a:r>
-                        <a:rPr lang="en-US" sz="900" dirty="0" err="1"/>
+                        <a:rPr lang="en-US" sz="1000" dirty="0" err="1"/>
                         <a:t>userkey</a:t>
                       </a:r>
                       <a:r>
-                        <a:rPr lang="en-US" sz="900" dirty="0"/>
+                        <a:rPr lang="en-US" sz="1000" dirty="0"/>
                         <a:t>, </a:t>
                       </a:r>
                       <a:r>
-                        <a:rPr lang="en-US" sz="900" dirty="0" err="1"/>
+                        <a:rPr lang="en-US" sz="1000" dirty="0" err="1"/>
                         <a:t>fbid</a:t>
                       </a:r>
-                      <a:endParaRPr lang="en-US" sz="900" dirty="0"/>
+                      <a:endParaRPr lang="en-US" sz="1000" dirty="0"/>
                     </a:p>
                   </a:txBody>
                   <a:tcPr marL="45720" marR="45720" marT="27432" marB="27432"/>
@@ -24141,7 +24217,7 @@
                     <a:bodyPr/>
                     <a:lstStyle/>
                     <a:p>
-                      <a:endParaRPr lang="en-US" sz="900" dirty="0"/>
+                      <a:endParaRPr lang="en-US" sz="1000" dirty="0"/>
                     </a:p>
                   </a:txBody>
                   <a:tcPr marL="45720" marR="45720" marT="27432" marB="27432"/>
@@ -24152,20 +24228,20 @@
                     <a:lstStyle/>
                     <a:p>
                       <a:r>
-                        <a:rPr lang="en-US" sz="900" dirty="0"/>
+                        <a:rPr lang="en-US" sz="1000" dirty="0"/>
                         <a:t>exists</a:t>
                       </a:r>
                     </a:p>
                     <a:p>
                       <a:r>
-                        <a:rPr lang="en-US" sz="900" dirty="0"/>
+                        <a:rPr lang="en-US" sz="1000" dirty="0"/>
                         <a:t>invalid </a:t>
                       </a:r>
                       <a:r>
-                        <a:rPr lang="en-US" sz="900" dirty="0" err="1"/>
+                        <a:rPr lang="en-US" sz="1000" dirty="0" err="1"/>
                         <a:t>userkey</a:t>
                       </a:r>
-                      <a:endParaRPr lang="en-US" sz="900" dirty="0"/>
+                      <a:endParaRPr lang="en-US" sz="1000" dirty="0"/>
                     </a:p>
                   </a:txBody>
                   <a:tcPr marL="45720" marR="45720" marT="27432" marB="27432"/>
@@ -24193,23 +24269,23 @@
                         <a:defRPr/>
                       </a:pPr>
                       <a:r>
-                        <a:rPr lang="en-US" sz="900" dirty="0"/>
+                        <a:rPr lang="en-US" sz="1000" dirty="0"/>
                         <a:t>If </a:t>
                       </a:r>
                       <a:r>
-                        <a:rPr lang="en-US" sz="900" dirty="0" err="1"/>
+                        <a:rPr lang="en-US" sz="1000" dirty="0" err="1"/>
                         <a:t>fbid</a:t>
                       </a:r>
                       <a:r>
-                        <a:rPr lang="en-US" sz="900" dirty="0"/>
+                        <a:rPr lang="en-US" sz="1000" dirty="0"/>
                         <a:t> is already associated with </a:t>
                       </a:r>
                       <a:r>
-                        <a:rPr lang="en-US" sz="900" dirty="0" err="1"/>
+                        <a:rPr lang="en-US" sz="1000" dirty="0" err="1"/>
                         <a:t>userkey</a:t>
                       </a:r>
                       <a:r>
-                        <a:rPr lang="en-US" sz="900" dirty="0"/>
+                        <a:rPr lang="en-US" sz="1000" dirty="0"/>
                         <a:t>, no action (success)</a:t>
                       </a:r>
                     </a:p>
@@ -24222,21 +24298,21 @@
                   </a:ext>
                 </a:extLst>
               </a:tr>
-              <a:tr h="332771">
+              <a:tr h="221233">
                 <a:tc>
                   <a:txBody>
                     <a:bodyPr/>
                     <a:lstStyle/>
                     <a:p>
                       <a:r>
-                        <a:rPr lang="en-US" sz="900" dirty="0"/>
+                        <a:rPr lang="en-US" sz="1000" dirty="0"/>
                         <a:t>update</a:t>
                       </a:r>
                       <a:r>
-                        <a:rPr lang="en-US" sz="900" baseline="30000" dirty="0"/>
+                        <a:rPr lang="en-US" sz="1000" baseline="30000" dirty="0"/>
                         <a:t>(3)</a:t>
                       </a:r>
-                      <a:endParaRPr lang="en-US" sz="900" dirty="0"/>
+                      <a:endParaRPr lang="en-US" sz="1000" dirty="0"/>
                     </a:p>
                   </a:txBody>
                   <a:tcPr marL="45720" marR="45720" marT="27432" marB="27432"/>
@@ -24247,12 +24323,12 @@
                     <a:lstStyle/>
                     <a:p>
                       <a:r>
-                        <a:rPr lang="en-US" sz="900"/>
-                        <a:t>userkey, </a:t>
+                        <a:rPr lang="en-US" sz="1000" dirty="0" err="1"/>
+                        <a:t>userkey</a:t>
                       </a:r>
                       <a:r>
-                        <a:rPr lang="en-US" sz="900" dirty="0"/>
-                        <a:t>[password], [alias], [email]</a:t>
+                        <a:rPr lang="en-US" sz="1000" dirty="0"/>
+                        <a:t>, [password], [alias], [email]</a:t>
                       </a:r>
                     </a:p>
                   </a:txBody>
@@ -24263,7 +24339,7 @@
                     <a:bodyPr/>
                     <a:lstStyle/>
                     <a:p>
-                      <a:endParaRPr lang="en-US" sz="900" dirty="0"/>
+                      <a:endParaRPr lang="en-US" sz="1000" dirty="0"/>
                     </a:p>
                   </a:txBody>
                   <a:tcPr marL="45720" marR="45720" marT="27432" marB="27432"/>
@@ -24274,18 +24350,18 @@
                     <a:lstStyle/>
                     <a:p>
                       <a:r>
-                        <a:rPr lang="en-US" sz="900" dirty="0"/>
+                        <a:rPr lang="en-US" sz="1000" dirty="0"/>
                         <a:t>invalid </a:t>
                       </a:r>
                       <a:r>
-                        <a:rPr lang="en-US" sz="900" dirty="0" err="1"/>
+                        <a:rPr lang="en-US" sz="1000" dirty="0" err="1"/>
                         <a:t>userkey</a:t>
                       </a:r>
-                      <a:endParaRPr lang="en-US" sz="900" dirty="0"/>
+                      <a:endParaRPr lang="en-US" sz="1000" dirty="0"/>
                     </a:p>
                     <a:p>
                       <a:r>
-                        <a:rPr lang="en-US" sz="900" dirty="0"/>
+                        <a:rPr lang="en-US" sz="1000" dirty="0"/>
                         <a:t>Incorrect username</a:t>
                       </a:r>
                     </a:p>
@@ -24298,7 +24374,7 @@
                     <a:lstStyle/>
                     <a:p>
                       <a:r>
-                        <a:rPr lang="en-US" sz="900" dirty="0"/>
+                        <a:rPr lang="en-US" sz="1000" dirty="0"/>
                         <a:t>should never send invalid password</a:t>
                       </a:r>
                     </a:p>
@@ -24311,14 +24387,14 @@
                   </a:ext>
                 </a:extLst>
               </a:tr>
-              <a:tr h="191766">
+              <a:tr h="129053">
                 <a:tc>
                   <a:txBody>
                     <a:bodyPr/>
                     <a:lstStyle/>
                     <a:p>
                       <a:r>
-                        <a:rPr lang="en-US" sz="900" dirty="0">
+                        <a:rPr lang="en-US" sz="1000" dirty="0">
                           <a:highlight>
                             <a:srgbClr val="FFFF00"/>
                           </a:highlight>
@@ -24335,10 +24411,10 @@
                     <a:lstStyle/>
                     <a:p>
                       <a:r>
-                        <a:rPr lang="en-US" sz="900" dirty="0" err="1"/>
+                        <a:rPr lang="en-US" sz="1000" dirty="0" err="1"/>
                         <a:t>userkey</a:t>
                       </a:r>
-                      <a:endParaRPr lang="en-US" sz="900" dirty="0"/>
+                      <a:endParaRPr lang="en-US" sz="1000" dirty="0"/>
                     </a:p>
                   </a:txBody>
                   <a:tcPr marL="45720" marR="45720" marT="27432" marB="27432"/>
@@ -24349,10 +24425,10 @@
                     <a:lstStyle/>
                     <a:p>
                       <a:r>
-                        <a:rPr lang="en-US" sz="900" dirty="0" err="1"/>
+                        <a:rPr lang="en-US" sz="1000" dirty="0" err="1"/>
                         <a:t>opponent_data</a:t>
                       </a:r>
-                      <a:endParaRPr lang="en-US" sz="900" dirty="0"/>
+                      <a:endParaRPr lang="en-US" sz="1000" dirty="0"/>
                     </a:p>
                   </a:txBody>
                   <a:tcPr marL="45720" marR="45720" marT="27432" marB="27432"/>
@@ -24363,14 +24439,14 @@
                     <a:lstStyle/>
                     <a:p>
                       <a:r>
-                        <a:rPr lang="en-US" sz="900" dirty="0"/>
+                        <a:rPr lang="en-US" sz="1000" dirty="0"/>
                         <a:t>invalid </a:t>
                       </a:r>
                       <a:r>
-                        <a:rPr lang="en-US" sz="900" dirty="0" err="1"/>
+                        <a:rPr lang="en-US" sz="1000" dirty="0" err="1"/>
                         <a:t>userkey</a:t>
                       </a:r>
-                      <a:endParaRPr lang="en-US" sz="900" dirty="0"/>
+                      <a:endParaRPr lang="en-US" sz="1000" dirty="0"/>
                     </a:p>
                   </a:txBody>
                   <a:tcPr marL="45720" marR="45720" marT="27432" marB="27432"/>
@@ -24381,15 +24457,15 @@
                     <a:lstStyle/>
                     <a:p>
                       <a:r>
-                        <a:rPr lang="en-US" sz="900" dirty="0"/>
+                        <a:rPr lang="en-US" sz="1000" dirty="0"/>
                         <a:t>update </a:t>
                       </a:r>
                       <a:r>
-                        <a:rPr lang="en-US" sz="900" dirty="0" err="1"/>
+                        <a:rPr lang="en-US" sz="1000" dirty="0" err="1"/>
                         <a:t>last_loss</a:t>
                       </a:r>
                       <a:r>
-                        <a:rPr lang="en-US" sz="900" dirty="0"/>
+                        <a:rPr lang="en-US" sz="1000" dirty="0"/>
                         <a:t> to current time</a:t>
                       </a:r>
                     </a:p>
@@ -24402,14 +24478,14 @@
                   </a:ext>
                 </a:extLst>
               </a:tr>
-              <a:tr h="191766">
+              <a:tr h="129053">
                 <a:tc>
                   <a:txBody>
                     <a:bodyPr/>
                     <a:lstStyle/>
                     <a:p>
                       <a:r>
-                        <a:rPr lang="en-US" sz="900" dirty="0">
+                        <a:rPr lang="en-US" sz="1000" dirty="0">
                           <a:highlight>
                             <a:srgbClr val="FFFF00"/>
                           </a:highlight>
@@ -24443,10 +24519,10 @@
                         <a:defRPr/>
                       </a:pPr>
                       <a:r>
-                        <a:rPr lang="en-US" sz="900" dirty="0" err="1"/>
+                        <a:rPr lang="en-US" sz="1000" dirty="0" err="1"/>
                         <a:t>userkey</a:t>
                       </a:r>
-                      <a:endParaRPr lang="en-US" sz="900" dirty="0"/>
+                      <a:endParaRPr lang="en-US" sz="1000" dirty="0"/>
                     </a:p>
                   </a:txBody>
                   <a:tcPr marL="45720" marR="45720" marT="27432" marB="27432"/>
@@ -24474,10 +24550,10 @@
                         <a:defRPr/>
                       </a:pPr>
                       <a:r>
-                        <a:rPr lang="en-US" sz="900" dirty="0" err="1"/>
+                        <a:rPr lang="en-US" sz="1000" dirty="0" err="1"/>
                         <a:t>opponent_data</a:t>
                       </a:r>
-                      <a:endParaRPr lang="en-US" sz="900" dirty="0"/>
+                      <a:endParaRPr lang="en-US" sz="1000" dirty="0"/>
                     </a:p>
                   </a:txBody>
                   <a:tcPr marL="45720" marR="45720" marT="27432" marB="27432"/>
@@ -24488,14 +24564,14 @@
                     <a:lstStyle/>
                     <a:p>
                       <a:r>
-                        <a:rPr lang="en-US" sz="900" dirty="0"/>
+                        <a:rPr lang="en-US" sz="1000" dirty="0"/>
                         <a:t>invalid </a:t>
                       </a:r>
                       <a:r>
-                        <a:rPr lang="en-US" sz="900" dirty="0" err="1"/>
+                        <a:rPr lang="en-US" sz="1000" dirty="0" err="1"/>
                         <a:t>userkey</a:t>
                       </a:r>
-                      <a:endParaRPr lang="en-US" sz="900" dirty="0"/>
+                      <a:endParaRPr lang="en-US" sz="1000" dirty="0"/>
                     </a:p>
                   </a:txBody>
                   <a:tcPr marL="45720" marR="45720" marT="27432" marB="27432"/>
@@ -24522,7 +24598,7 @@
                         <a:tabLst/>
                         <a:defRPr/>
                       </a:pPr>
-                      <a:endParaRPr lang="en-US" sz="900" dirty="0"/>
+                      <a:endParaRPr lang="en-US" sz="1000" dirty="0"/>
                     </a:p>
                   </a:txBody>
                   <a:tcPr marL="45720" marR="45720" marT="27432" marB="27432"/>

</xml_diff>